<commit_message>
se suben documentos actualizados.  Se agrega el diagrama de Casos de Uso de PoC
</commit_message>
<xml_diff>
--- a/documents/Fútbol 5 app.pptx
+++ b/documents/Fútbol 5 app.pptx
@@ -14,35 +14,37 @@
     <p:sldId id="259" r:id="rId9"/>
     <p:sldId id="260" r:id="rId10"/>
     <p:sldId id="261" r:id="rId11"/>
+    <p:sldId id="262" r:id="rId12"/>
+    <p:sldId id="263" r:id="rId13"/>
   </p:sldIdLst>
   <p:sldSz cy="5143500" cx="9144000"/>
   <p:notesSz cx="6858000" cy="9144000"/>
   <p:embeddedFontLst>
     <p:embeddedFont>
       <p:font typeface="Raleway"/>
-      <p:regular r:id="rId12"/>
-      <p:bold r:id="rId13"/>
-      <p:italic r:id="rId14"/>
-      <p:boldItalic r:id="rId15"/>
+      <p:regular r:id="rId14"/>
+      <p:bold r:id="rId15"/>
+      <p:italic r:id="rId16"/>
+      <p:boldItalic r:id="rId17"/>
     </p:embeddedFont>
     <p:embeddedFont>
       <p:font typeface="Spectral SemiBold"/>
-      <p:regular r:id="rId16"/>
-      <p:bold r:id="rId17"/>
-      <p:italic r:id="rId18"/>
-      <p:boldItalic r:id="rId19"/>
+      <p:regular r:id="rId18"/>
+      <p:bold r:id="rId19"/>
+      <p:italic r:id="rId20"/>
+      <p:boldItalic r:id="rId21"/>
     </p:embeddedFont>
     <p:embeddedFont>
       <p:font typeface="Source Sans Pro"/>
-      <p:regular r:id="rId20"/>
-      <p:bold r:id="rId21"/>
-      <p:italic r:id="rId22"/>
-      <p:boldItalic r:id="rId23"/>
+      <p:regular r:id="rId22"/>
+      <p:bold r:id="rId23"/>
+      <p:italic r:id="rId24"/>
+      <p:boldItalic r:id="rId25"/>
     </p:embeddedFont>
     <p:embeddedFont>
       <p:font typeface="Spectral ExtraBold"/>
-      <p:bold r:id="rId24"/>
-      <p:boldItalic r:id="rId25"/>
+      <p:bold r:id="rId26"/>
+      <p:boldItalic r:id="rId27"/>
     </p:embeddedFont>
   </p:embeddedFontLst>
   <p:defaultTextStyle>
@@ -738,7 +740,7 @@
       </p:grpSpPr>
       <p:sp>
         <p:nvSpPr>
-          <p:cNvPr id="55" name="Google Shape;55;g52e536e102_0_0:notes"/>
+          <p:cNvPr id="55" name="Google Shape;55;g52e536e102_0_6:notes"/>
           <p:cNvSpPr/>
           <p:nvPr>
             <p:ph idx="2" type="sldImg"/>
@@ -773,7 +775,7 @@
       </p:sp>
       <p:sp>
         <p:nvSpPr>
-          <p:cNvPr id="56" name="Google Shape;56;g52e536e102_0_0:notes"/>
+          <p:cNvPr id="56" name="Google Shape;56;g52e536e102_0_6:notes"/>
           <p:cNvSpPr txBox="1"/>
           <p:nvPr>
             <p:ph idx="1" type="body"/>
@@ -837,7 +839,7 @@
       </p:grpSpPr>
       <p:sp>
         <p:nvSpPr>
-          <p:cNvPr id="61" name="Google Shape;61;g52e536e102_0_6:notes"/>
+          <p:cNvPr id="61" name="Google Shape;61;g52e536e102_0_0:notes"/>
           <p:cNvSpPr/>
           <p:nvPr>
             <p:ph idx="2" type="sldImg"/>
@@ -872,7 +874,7 @@
       </p:sp>
       <p:sp>
         <p:nvSpPr>
-          <p:cNvPr id="62" name="Google Shape;62;g52e536e102_0_6:notes"/>
+          <p:cNvPr id="62" name="Google Shape;62;g52e536e102_0_0:notes"/>
           <p:cNvSpPr txBox="1"/>
           <p:nvPr>
             <p:ph idx="1" type="body"/>
@@ -936,7 +938,7 @@
       </p:grpSpPr>
       <p:sp>
         <p:nvSpPr>
-          <p:cNvPr id="67" name="Google Shape;67;g52e536e102_0_11:notes"/>
+          <p:cNvPr id="67" name="Google Shape;67;g52e536e102_0_778:notes"/>
           <p:cNvSpPr/>
           <p:nvPr>
             <p:ph idx="2" type="sldImg"/>
@@ -971,7 +973,7 @@
       </p:sp>
       <p:sp>
         <p:nvSpPr>
-          <p:cNvPr id="68" name="Google Shape;68;g52e536e102_0_11:notes"/>
+          <p:cNvPr id="68" name="Google Shape;68;g52e536e102_0_778:notes"/>
           <p:cNvSpPr txBox="1"/>
           <p:nvPr>
             <p:ph idx="1" type="body"/>
@@ -1035,7 +1037,7 @@
       </p:grpSpPr>
       <p:sp>
         <p:nvSpPr>
-          <p:cNvPr id="73" name="Google Shape;73;g52e536e102_0_16:notes"/>
+          <p:cNvPr id="73" name="Google Shape;73;g52e536e102_0_11:notes"/>
           <p:cNvSpPr/>
           <p:nvPr>
             <p:ph idx="2" type="sldImg"/>
@@ -1070,7 +1072,7 @@
       </p:sp>
       <p:sp>
         <p:nvSpPr>
-          <p:cNvPr id="74" name="Google Shape;74;g52e536e102_0_16:notes"/>
+          <p:cNvPr id="74" name="Google Shape;74;g52e536e102_0_11:notes"/>
           <p:cNvSpPr txBox="1"/>
           <p:nvPr>
             <p:ph idx="1" type="body"/>
@@ -1134,7 +1136,106 @@
       </p:grpSpPr>
       <p:sp>
         <p:nvSpPr>
-          <p:cNvPr id="79" name="Google Shape;79;p:notes"/>
+          <p:cNvPr id="79" name="Google Shape;79;g52e536e102_0_16:notes"/>
+          <p:cNvSpPr/>
+          <p:nvPr>
+            <p:ph idx="2" type="sldImg"/>
+          </p:nvPr>
+        </p:nvSpPr>
+        <p:spPr>
+          <a:xfrm>
+            <a:off x="381300" y="685800"/>
+            <a:ext cx="6096000" cy="3429000"/>
+          </a:xfrm>
+          <a:custGeom>
+            <a:rect b="b" l="l" r="r" t="t"/>
+            <a:pathLst>
+              <a:path extrusionOk="0" h="120000" w="120000">
+                <a:moveTo>
+                  <a:pt x="0" y="0"/>
+                </a:moveTo>
+                <a:lnTo>
+                  <a:pt x="120000" y="0"/>
+                </a:lnTo>
+                <a:lnTo>
+                  <a:pt x="120000" y="120000"/>
+                </a:lnTo>
+                <a:lnTo>
+                  <a:pt x="0" y="120000"/>
+                </a:lnTo>
+                <a:close/>
+              </a:path>
+            </a:pathLst>
+          </a:custGeom>
+        </p:spPr>
+      </p:sp>
+      <p:sp>
+        <p:nvSpPr>
+          <p:cNvPr id="80" name="Google Shape;80;g52e536e102_0_16:notes"/>
+          <p:cNvSpPr txBox="1"/>
+          <p:nvPr>
+            <p:ph idx="1" type="body"/>
+          </p:nvPr>
+        </p:nvSpPr>
+        <p:spPr>
+          <a:xfrm>
+            <a:off x="685800" y="4343400"/>
+            <a:ext cx="5486400" cy="4114800"/>
+          </a:xfrm>
+          <a:prstGeom prst="rect">
+            <a:avLst/>
+          </a:prstGeom>
+        </p:spPr>
+        <p:txBody>
+          <a:bodyPr anchorCtr="0" anchor="t" bIns="91425" lIns="91425" spcFirstLastPara="1" rIns="91425" wrap="square" tIns="91425">
+            <a:noAutofit/>
+          </a:bodyPr>
+          <a:lstStyle/>
+          <a:p>
+            <a:pPr indent="0" lvl="0" marL="0" rtl="0" algn="l">
+              <a:spcBef>
+                <a:spcPts val="0"/>
+              </a:spcBef>
+              <a:spcAft>
+                <a:spcPts val="0"/>
+              </a:spcAft>
+              <a:buNone/>
+            </a:pPr>
+            <a:r>
+              <a:t/>
+            </a:r>
+            <a:endParaRPr/>
+          </a:p>
+        </p:txBody>
+      </p:sp>
+    </p:spTree>
+  </p:cSld>
+  <p:clrMapOvr>
+    <a:masterClrMapping/>
+  </p:clrMapOvr>
+</p:notes>
+</file>
+
+<file path=ppt/notesSlides/notesSlide6.xml><?xml version="1.0" encoding="utf-8"?>
+<p:notes xmlns:a="http://schemas.openxmlformats.org/drawingml/2006/main" xmlns:r="http://schemas.openxmlformats.org/officeDocument/2006/relationships" xmlns:mc="http://schemas.openxmlformats.org/markup-compatibility/2006" xmlns:mv="urn:schemas-microsoft-com:mac:vml" xmlns:p="http://schemas.openxmlformats.org/presentationml/2006/main" xmlns:c="http://schemas.openxmlformats.org/drawingml/2006/chart" xmlns:dgm="http://schemas.openxmlformats.org/drawingml/2006/diagram" xmlns:o="urn:schemas-microsoft-com:office:office" xmlns:v="urn:schemas-microsoft-com:vml" xmlns:pvml="urn:schemas-microsoft-com:office:powerpoint" xmlns:com="http://schemas.openxmlformats.org/drawingml/2006/compatibility" xmlns:p14="http://schemas.microsoft.com/office/powerpoint/2010/main" xmlns:p15="http://schemas.microsoft.com/office/powerpoint/2012/main" showMasterPhAnim="0" showMasterSp="0">
+  <p:cSld>
+    <p:spTree>
+      <p:nvGrpSpPr>
+        <p:cNvPr id="84" name="Shape 84"/>
+        <p:cNvGrpSpPr/>
+        <p:nvPr/>
+      </p:nvGrpSpPr>
+      <p:grpSpPr>
+        <a:xfrm>
+          <a:off x="0" y="0"/>
+          <a:ext cx="0" cy="0"/>
+          <a:chOff x="0" y="0"/>
+          <a:chExt cx="0" cy="0"/>
+        </a:xfrm>
+      </p:grpSpPr>
+      <p:sp>
+        <p:nvSpPr>
+          <p:cNvPr id="85" name="Google Shape;85;p:notes"/>
           <p:cNvSpPr/>
           <p:nvPr>
             <p:ph idx="2" type="sldImg"/>
@@ -1169,7 +1270,7 @@
       </p:sp>
       <p:sp>
         <p:nvSpPr>
-          <p:cNvPr id="80" name="Google Shape;80;p:notes"/>
+          <p:cNvPr id="86" name="Google Shape;86;p:notes"/>
           <p:cNvSpPr txBox="1"/>
           <p:nvPr>
             <p:ph idx="1" type="body"/>
@@ -1214,12 +1315,12 @@
 </p:notes>
 </file>
 
-<file path=ppt/notesSlides/notesSlide6.xml><?xml version="1.0" encoding="utf-8"?>
+<file path=ppt/notesSlides/notesSlide7.xml><?xml version="1.0" encoding="utf-8"?>
 <p:notes xmlns:a="http://schemas.openxmlformats.org/drawingml/2006/main" xmlns:r="http://schemas.openxmlformats.org/officeDocument/2006/relationships" xmlns:mc="http://schemas.openxmlformats.org/markup-compatibility/2006" xmlns:mv="urn:schemas-microsoft-com:mac:vml" xmlns:p="http://schemas.openxmlformats.org/presentationml/2006/main" xmlns:c="http://schemas.openxmlformats.org/drawingml/2006/chart" xmlns:dgm="http://schemas.openxmlformats.org/drawingml/2006/diagram" xmlns:o="urn:schemas-microsoft-com:office:office" xmlns:v="urn:schemas-microsoft-com:vml" xmlns:pvml="urn:schemas-microsoft-com:office:powerpoint" xmlns:com="http://schemas.openxmlformats.org/drawingml/2006/compatibility" xmlns:p14="http://schemas.microsoft.com/office/powerpoint/2010/main" xmlns:p15="http://schemas.microsoft.com/office/powerpoint/2012/main" showMasterPhAnim="0" showMasterSp="0">
   <p:cSld>
     <p:spTree>
       <p:nvGrpSpPr>
-        <p:cNvPr id="85" name="Shape 85"/>
+        <p:cNvPr id="91" name="Shape 91"/>
         <p:cNvGrpSpPr/>
         <p:nvPr/>
       </p:nvGrpSpPr>
@@ -1233,7 +1334,7 @@
       </p:grpSpPr>
       <p:sp>
         <p:nvSpPr>
-          <p:cNvPr id="86" name="Google Shape;86;g52e536e102_0_281:notes"/>
+          <p:cNvPr id="92" name="Google Shape;92;g52e536e102_0_783:notes"/>
           <p:cNvSpPr/>
           <p:nvPr>
             <p:ph idx="2" type="sldImg"/>
@@ -1268,7 +1369,106 @@
       </p:sp>
       <p:sp>
         <p:nvSpPr>
-          <p:cNvPr id="87" name="Google Shape;87;g52e536e102_0_281:notes"/>
+          <p:cNvPr id="93" name="Google Shape;93;g52e536e102_0_783:notes"/>
+          <p:cNvSpPr txBox="1"/>
+          <p:nvPr>
+            <p:ph idx="1" type="body"/>
+          </p:nvPr>
+        </p:nvSpPr>
+        <p:spPr>
+          <a:xfrm>
+            <a:off x="685800" y="4343400"/>
+            <a:ext cx="5486400" cy="4114800"/>
+          </a:xfrm>
+          <a:prstGeom prst="rect">
+            <a:avLst/>
+          </a:prstGeom>
+        </p:spPr>
+        <p:txBody>
+          <a:bodyPr anchorCtr="0" anchor="t" bIns="91425" lIns="91425" spcFirstLastPara="1" rIns="91425" wrap="square" tIns="91425">
+            <a:noAutofit/>
+          </a:bodyPr>
+          <a:lstStyle/>
+          <a:p>
+            <a:pPr indent="0" lvl="0" marL="0" rtl="0" algn="l">
+              <a:spcBef>
+                <a:spcPts val="0"/>
+              </a:spcBef>
+              <a:spcAft>
+                <a:spcPts val="0"/>
+              </a:spcAft>
+              <a:buNone/>
+            </a:pPr>
+            <a:r>
+              <a:t/>
+            </a:r>
+            <a:endParaRPr/>
+          </a:p>
+        </p:txBody>
+      </p:sp>
+    </p:spTree>
+  </p:cSld>
+  <p:clrMapOvr>
+    <a:masterClrMapping/>
+  </p:clrMapOvr>
+</p:notes>
+</file>
+
+<file path=ppt/notesSlides/notesSlide8.xml><?xml version="1.0" encoding="utf-8"?>
+<p:notes xmlns:a="http://schemas.openxmlformats.org/drawingml/2006/main" xmlns:r="http://schemas.openxmlformats.org/officeDocument/2006/relationships" xmlns:mc="http://schemas.openxmlformats.org/markup-compatibility/2006" xmlns:mv="urn:schemas-microsoft-com:mac:vml" xmlns:p="http://schemas.openxmlformats.org/presentationml/2006/main" xmlns:c="http://schemas.openxmlformats.org/drawingml/2006/chart" xmlns:dgm="http://schemas.openxmlformats.org/drawingml/2006/diagram" xmlns:o="urn:schemas-microsoft-com:office:office" xmlns:v="urn:schemas-microsoft-com:vml" xmlns:pvml="urn:schemas-microsoft-com:office:powerpoint" xmlns:com="http://schemas.openxmlformats.org/drawingml/2006/compatibility" xmlns:p14="http://schemas.microsoft.com/office/powerpoint/2010/main" xmlns:p15="http://schemas.microsoft.com/office/powerpoint/2012/main" showMasterPhAnim="0" showMasterSp="0">
+  <p:cSld>
+    <p:spTree>
+      <p:nvGrpSpPr>
+        <p:cNvPr id="96" name="Shape 96"/>
+        <p:cNvGrpSpPr/>
+        <p:nvPr/>
+      </p:nvGrpSpPr>
+      <p:grpSpPr>
+        <a:xfrm>
+          <a:off x="0" y="0"/>
+          <a:ext cx="0" cy="0"/>
+          <a:chOff x="0" y="0"/>
+          <a:chExt cx="0" cy="0"/>
+        </a:xfrm>
+      </p:grpSpPr>
+      <p:sp>
+        <p:nvSpPr>
+          <p:cNvPr id="97" name="Google Shape;97;g52e536e102_0_281:notes"/>
+          <p:cNvSpPr/>
+          <p:nvPr>
+            <p:ph idx="2" type="sldImg"/>
+          </p:nvPr>
+        </p:nvSpPr>
+        <p:spPr>
+          <a:xfrm>
+            <a:off x="381300" y="685800"/>
+            <a:ext cx="6096000" cy="3429000"/>
+          </a:xfrm>
+          <a:custGeom>
+            <a:rect b="b" l="l" r="r" t="t"/>
+            <a:pathLst>
+              <a:path extrusionOk="0" h="120000" w="120000">
+                <a:moveTo>
+                  <a:pt x="0" y="0"/>
+                </a:moveTo>
+                <a:lnTo>
+                  <a:pt x="120000" y="0"/>
+                </a:lnTo>
+                <a:lnTo>
+                  <a:pt x="120000" y="120000"/>
+                </a:lnTo>
+                <a:lnTo>
+                  <a:pt x="0" y="120000"/>
+                </a:lnTo>
+                <a:close/>
+              </a:path>
+            </a:pathLst>
+          </a:custGeom>
+        </p:spPr>
+      </p:sp>
+      <p:sp>
+        <p:nvSpPr>
+          <p:cNvPr id="98" name="Google Shape;98;g52e536e102_0_281:notes"/>
           <p:cNvSpPr txBox="1"/>
           <p:nvPr>
             <p:ph idx="1" type="body"/>
@@ -6700,7 +6900,7 @@
         </p:nvSpPr>
         <p:spPr>
           <a:xfrm>
-            <a:off x="311700" y="445025"/>
+            <a:off x="311700" y="355375"/>
             <a:ext cx="8520600" cy="623400"/>
           </a:xfrm>
           <a:prstGeom prst="rect">
@@ -6723,15 +6923,41 @@
               <a:buNone/>
             </a:pPr>
             <a:r>
-              <a:rPr lang="es" sz="4800">
+              <a:rPr b="0" lang="es" sz="4200">
                 <a:latin typeface="Spectral ExtraBold"/>
                 <a:ea typeface="Spectral ExtraBold"/>
                 <a:cs typeface="Spectral ExtraBold"/>
                 <a:sym typeface="Spectral ExtraBold"/>
               </a:rPr>
-              <a:t>Fútbol 5 app</a:t>
+              <a:t>Prueba de Concepto </a:t>
             </a:r>
-            <a:endParaRPr sz="4800">
+            <a:endParaRPr b="0" sz="4200">
+              <a:latin typeface="Spectral ExtraBold"/>
+              <a:ea typeface="Spectral ExtraBold"/>
+              <a:cs typeface="Spectral ExtraBold"/>
+              <a:sym typeface="Spectral ExtraBold"/>
+            </a:endParaRPr>
+          </a:p>
+          <a:p>
+            <a:pPr indent="0" lvl="0" marL="0" rtl="0" algn="ctr">
+              <a:spcBef>
+                <a:spcPts val="0"/>
+              </a:spcBef>
+              <a:spcAft>
+                <a:spcPts val="0"/>
+              </a:spcAft>
+              <a:buNone/>
+            </a:pPr>
+            <a:r>
+              <a:rPr b="0" lang="es" sz="4200">
+                <a:latin typeface="Spectral ExtraBold"/>
+                <a:ea typeface="Spectral ExtraBold"/>
+                <a:cs typeface="Spectral ExtraBold"/>
+                <a:sym typeface="Spectral ExtraBold"/>
+              </a:rPr>
+              <a:t>F5 app</a:t>
+            </a:r>
+            <a:endParaRPr b="0" sz="4200">
               <a:latin typeface="Spectral ExtraBold"/>
               <a:ea typeface="Spectral ExtraBold"/>
               <a:cs typeface="Spectral ExtraBold"/>
@@ -6740,34 +6966,210 @@
           </a:p>
         </p:txBody>
       </p:sp>
-      <p:pic>
-        <p:nvPicPr>
+      <p:sp>
+        <p:nvSpPr>
           <p:cNvPr id="59" name="Google Shape;59;p13"/>
-          <p:cNvPicPr preferRelativeResize="0"/>
-          <p:nvPr/>
-        </p:nvPicPr>
-        <p:blipFill>
-          <a:blip r:embed="rId3">
-            <a:alphaModFix/>
-          </a:blip>
-          <a:stretch>
-            <a:fillRect/>
-          </a:stretch>
-        </p:blipFill>
+          <p:cNvSpPr txBox="1"/>
+          <p:nvPr>
+            <p:ph idx="1" type="body"/>
+          </p:nvPr>
+        </p:nvSpPr>
         <p:spPr>
           <a:xfrm>
-            <a:off x="3092825" y="2235578"/>
-            <a:ext cx="2674000" cy="2674000"/>
+            <a:off x="532350" y="1371100"/>
+            <a:ext cx="8227200" cy="1290300"/>
           </a:xfrm>
           <a:prstGeom prst="rect">
             <a:avLst/>
           </a:prstGeom>
-          <a:noFill/>
-          <a:ln>
-            <a:noFill/>
-          </a:ln>
         </p:spPr>
-      </p:pic>
+        <p:txBody>
+          <a:bodyPr anchorCtr="0" anchor="t" bIns="91425" lIns="91425" spcFirstLastPara="1" rIns="91425" wrap="square" tIns="91425">
+            <a:noAutofit/>
+          </a:bodyPr>
+          <a:lstStyle/>
+          <a:p>
+            <a:pPr indent="0" lvl="0" marL="0" rtl="0" algn="l">
+              <a:spcBef>
+                <a:spcPts val="0"/>
+              </a:spcBef>
+              <a:spcAft>
+                <a:spcPts val="0"/>
+              </a:spcAft>
+              <a:buNone/>
+            </a:pPr>
+            <a:r>
+              <a:t/>
+            </a:r>
+            <a:endParaRPr sz="2000">
+              <a:solidFill>
+                <a:srgbClr val="24292E"/>
+              </a:solidFill>
+              <a:highlight>
+                <a:srgbClr val="FFFFFF"/>
+              </a:highlight>
+              <a:latin typeface="Spectral SemiBold"/>
+              <a:ea typeface="Spectral SemiBold"/>
+              <a:cs typeface="Spectral SemiBold"/>
+              <a:sym typeface="Spectral SemiBold"/>
+            </a:endParaRPr>
+          </a:p>
+          <a:p>
+            <a:pPr indent="0" lvl="0" marL="0" rtl="0" algn="l">
+              <a:spcBef>
+                <a:spcPts val="1600"/>
+              </a:spcBef>
+              <a:spcAft>
+                <a:spcPts val="0"/>
+              </a:spcAft>
+              <a:buNone/>
+            </a:pPr>
+            <a:r>
+              <a:t/>
+            </a:r>
+            <a:endParaRPr sz="2000">
+              <a:solidFill>
+                <a:srgbClr val="24292E"/>
+              </a:solidFill>
+              <a:highlight>
+                <a:srgbClr val="FFFFFF"/>
+              </a:highlight>
+              <a:latin typeface="Spectral SemiBold"/>
+              <a:ea typeface="Spectral SemiBold"/>
+              <a:cs typeface="Spectral SemiBold"/>
+              <a:sym typeface="Spectral SemiBold"/>
+            </a:endParaRPr>
+          </a:p>
+          <a:p>
+            <a:pPr indent="0" lvl="0" marL="0" rtl="0" algn="l">
+              <a:spcBef>
+                <a:spcPts val="1600"/>
+              </a:spcBef>
+              <a:spcAft>
+                <a:spcPts val="0"/>
+              </a:spcAft>
+              <a:buNone/>
+            </a:pPr>
+            <a:r>
+              <a:t/>
+            </a:r>
+            <a:endParaRPr sz="2100">
+              <a:solidFill>
+                <a:srgbClr val="24292E"/>
+              </a:solidFill>
+              <a:highlight>
+                <a:srgbClr val="FFFFFF"/>
+              </a:highlight>
+              <a:latin typeface="Spectral SemiBold"/>
+              <a:ea typeface="Spectral SemiBold"/>
+              <a:cs typeface="Spectral SemiBold"/>
+              <a:sym typeface="Spectral SemiBold"/>
+            </a:endParaRPr>
+          </a:p>
+          <a:p>
+            <a:pPr indent="0" lvl="0" marL="0" rtl="0" algn="l">
+              <a:spcBef>
+                <a:spcPts val="1600"/>
+              </a:spcBef>
+              <a:spcAft>
+                <a:spcPts val="0"/>
+              </a:spcAft>
+              <a:buNone/>
+            </a:pPr>
+            <a:r>
+              <a:rPr lang="es" sz="2100">
+                <a:solidFill>
+                  <a:srgbClr val="24292E"/>
+                </a:solidFill>
+                <a:highlight>
+                  <a:srgbClr val="FFFFFF"/>
+                </a:highlight>
+                <a:latin typeface="Spectral SemiBold"/>
+                <a:ea typeface="Spectral SemiBold"/>
+                <a:cs typeface="Spectral SemiBold"/>
+                <a:sym typeface="Spectral SemiBold"/>
+              </a:rPr>
+              <a:t>Integrante:  Mariano Verdecanna</a:t>
+            </a:r>
+            <a:endParaRPr sz="2100">
+              <a:solidFill>
+                <a:srgbClr val="24292E"/>
+              </a:solidFill>
+              <a:highlight>
+                <a:srgbClr val="FFFFFF"/>
+              </a:highlight>
+              <a:latin typeface="Spectral SemiBold"/>
+              <a:ea typeface="Spectral SemiBold"/>
+              <a:cs typeface="Spectral SemiBold"/>
+              <a:sym typeface="Spectral SemiBold"/>
+            </a:endParaRPr>
+          </a:p>
+          <a:p>
+            <a:pPr indent="0" lvl="0" marL="0" rtl="0" algn="l">
+              <a:spcBef>
+                <a:spcPts val="1600"/>
+              </a:spcBef>
+              <a:spcAft>
+                <a:spcPts val="0"/>
+              </a:spcAft>
+              <a:buNone/>
+            </a:pPr>
+            <a:r>
+              <a:t/>
+            </a:r>
+            <a:endParaRPr sz="2000">
+              <a:solidFill>
+                <a:srgbClr val="24292E"/>
+              </a:solidFill>
+              <a:highlight>
+                <a:srgbClr val="FFFFFF"/>
+              </a:highlight>
+              <a:latin typeface="Spectral SemiBold"/>
+              <a:ea typeface="Spectral SemiBold"/>
+              <a:cs typeface="Spectral SemiBold"/>
+              <a:sym typeface="Spectral SemiBold"/>
+            </a:endParaRPr>
+          </a:p>
+          <a:p>
+            <a:pPr indent="0" lvl="0" marL="0" rtl="0" algn="l">
+              <a:spcBef>
+                <a:spcPts val="1600"/>
+              </a:spcBef>
+              <a:spcAft>
+                <a:spcPts val="1600"/>
+              </a:spcAft>
+              <a:buNone/>
+            </a:pPr>
+            <a:r>
+              <a:rPr lang="es" sz="2100">
+                <a:solidFill>
+                  <a:srgbClr val="24292E"/>
+                </a:solidFill>
+                <a:highlight>
+                  <a:srgbClr val="FFFFFF"/>
+                </a:highlight>
+                <a:latin typeface="Spectral SemiBold"/>
+                <a:ea typeface="Spectral SemiBold"/>
+                <a:cs typeface="Spectral SemiBold"/>
+                <a:sym typeface="Spectral SemiBold"/>
+              </a:rPr>
+              <a:t>Grupo:  7</a:t>
+            </a:r>
+            <a:endParaRPr sz="2100">
+              <a:solidFill>
+                <a:srgbClr val="24292E"/>
+              </a:solidFill>
+              <a:highlight>
+                <a:srgbClr val="FFFFFF"/>
+              </a:highlight>
+              <a:latin typeface="Spectral SemiBold"/>
+              <a:ea typeface="Spectral SemiBold"/>
+              <a:cs typeface="Spectral SemiBold"/>
+              <a:sym typeface="Spectral SemiBold"/>
+            </a:endParaRPr>
+          </a:p>
+        </p:txBody>
+      </p:sp>
     </p:spTree>
   </p:cSld>
   <p:clrMapOvr>
@@ -6803,7 +7205,7 @@
         </p:nvSpPr>
         <p:spPr>
           <a:xfrm>
-            <a:off x="311700" y="355375"/>
+            <a:off x="311700" y="445025"/>
             <a:ext cx="8520600" cy="623400"/>
           </a:xfrm>
           <a:prstGeom prst="rect">
@@ -6816,7 +7218,7 @@
           </a:bodyPr>
           <a:lstStyle/>
           <a:p>
-            <a:pPr indent="0" lvl="0" marL="0" rtl="0" algn="l">
+            <a:pPr indent="0" lvl="0" marL="0" rtl="0" algn="ctr">
               <a:spcBef>
                 <a:spcPts val="0"/>
               </a:spcBef>
@@ -6826,15 +7228,15 @@
               <a:buNone/>
             </a:pPr>
             <a:r>
-              <a:rPr b="0" lang="es">
+              <a:rPr lang="es" sz="4800">
                 <a:latin typeface="Spectral ExtraBold"/>
                 <a:ea typeface="Spectral ExtraBold"/>
                 <a:cs typeface="Spectral ExtraBold"/>
                 <a:sym typeface="Spectral ExtraBold"/>
               </a:rPr>
-              <a:t>Motivación</a:t>
+              <a:t>Fútbol 5 app</a:t>
             </a:r>
-            <a:endParaRPr b="0">
+            <a:endParaRPr sz="4800">
               <a:latin typeface="Spectral ExtraBold"/>
               <a:ea typeface="Spectral ExtraBold"/>
               <a:cs typeface="Spectral ExtraBold"/>
@@ -6843,124 +7245,34 @@
           </a:p>
         </p:txBody>
       </p:sp>
-      <p:sp>
-        <p:nvSpPr>
+      <p:pic>
+        <p:nvPicPr>
           <p:cNvPr id="65" name="Google Shape;65;p14"/>
-          <p:cNvSpPr txBox="1"/>
-          <p:nvPr>
-            <p:ph idx="1" type="body"/>
-          </p:nvPr>
-        </p:nvSpPr>
+          <p:cNvPicPr preferRelativeResize="0"/>
+          <p:nvPr/>
+        </p:nvPicPr>
+        <p:blipFill>
+          <a:blip r:embed="rId3">
+            <a:alphaModFix/>
+          </a:blip>
+          <a:stretch>
+            <a:fillRect/>
+          </a:stretch>
+        </p:blipFill>
         <p:spPr>
           <a:xfrm>
-            <a:off x="532350" y="1371100"/>
-            <a:ext cx="8227200" cy="1290300"/>
+            <a:off x="3092825" y="2235578"/>
+            <a:ext cx="2674000" cy="2674000"/>
           </a:xfrm>
           <a:prstGeom prst="rect">
             <a:avLst/>
           </a:prstGeom>
+          <a:noFill/>
+          <a:ln>
+            <a:noFill/>
+          </a:ln>
         </p:spPr>
-        <p:txBody>
-          <a:bodyPr anchorCtr="0" anchor="t" bIns="91425" lIns="91425" spcFirstLastPara="1" rIns="91425" wrap="square" tIns="91425">
-            <a:noAutofit/>
-          </a:bodyPr>
-          <a:lstStyle/>
-          <a:p>
-            <a:pPr indent="0" lvl="0" marL="0" rtl="0" algn="l">
-              <a:spcBef>
-                <a:spcPts val="0"/>
-              </a:spcBef>
-              <a:spcAft>
-                <a:spcPts val="0"/>
-              </a:spcAft>
-              <a:buClr>
-                <a:schemeClr val="dk2"/>
-              </a:buClr>
-              <a:buSzPts val="1100"/>
-              <a:buFont typeface="Arial"/>
-              <a:buNone/>
-            </a:pPr>
-            <a:r>
-              <a:rPr lang="es" sz="2000">
-                <a:solidFill>
-                  <a:srgbClr val="24292E"/>
-                </a:solidFill>
-                <a:highlight>
-                  <a:srgbClr val="FFFFFF"/>
-                </a:highlight>
-                <a:latin typeface="Spectral SemiBold"/>
-                <a:ea typeface="Spectral SemiBold"/>
-                <a:cs typeface="Spectral SemiBold"/>
-                <a:sym typeface="Spectral SemiBold"/>
-              </a:rPr>
-              <a:t>F5 surge como una idea para proyecto final para la universidad, inspirado principalmente en la posibilidad de poder armar algo que brinde una solución (o mejora) a una “problemática” diaria, dentro de un contexto de una actividad con amigos, como es jugar al fútbol.  Donde se mezclan la pasión por el deporte (en este caso el fútbol) y la posibilidad de divertirse con amigos.</a:t>
-            </a:r>
-            <a:endParaRPr sz="2000">
-              <a:solidFill>
-                <a:srgbClr val="24292E"/>
-              </a:solidFill>
-              <a:highlight>
-                <a:srgbClr val="FFFFFF"/>
-              </a:highlight>
-              <a:latin typeface="Spectral SemiBold"/>
-              <a:ea typeface="Spectral SemiBold"/>
-              <a:cs typeface="Spectral SemiBold"/>
-              <a:sym typeface="Spectral SemiBold"/>
-            </a:endParaRPr>
-          </a:p>
-          <a:p>
-            <a:pPr indent="0" lvl="0" marL="0" rtl="0" algn="l">
-              <a:spcBef>
-                <a:spcPts val="0"/>
-              </a:spcBef>
-              <a:spcAft>
-                <a:spcPts val="0"/>
-              </a:spcAft>
-              <a:buClr>
-                <a:schemeClr val="dk1"/>
-              </a:buClr>
-              <a:buSzPts val="1100"/>
-              <a:buFont typeface="Arial"/>
-              <a:buNone/>
-            </a:pPr>
-            <a:r>
-              <a:t/>
-            </a:r>
-            <a:endParaRPr sz="2000">
-              <a:solidFill>
-                <a:srgbClr val="000000"/>
-              </a:solidFill>
-              <a:latin typeface="Spectral SemiBold"/>
-              <a:ea typeface="Spectral SemiBold"/>
-              <a:cs typeface="Spectral SemiBold"/>
-              <a:sym typeface="Spectral SemiBold"/>
-            </a:endParaRPr>
-          </a:p>
-          <a:p>
-            <a:pPr indent="0" lvl="0" marL="0" rtl="0" algn="l">
-              <a:spcBef>
-                <a:spcPts val="0"/>
-              </a:spcBef>
-              <a:spcAft>
-                <a:spcPts val="1600"/>
-              </a:spcAft>
-              <a:buNone/>
-            </a:pPr>
-            <a:r>
-              <a:t/>
-            </a:r>
-            <a:endParaRPr sz="2000">
-              <a:solidFill>
-                <a:srgbClr val="000000"/>
-              </a:solidFill>
-              <a:latin typeface="Spectral SemiBold"/>
-              <a:ea typeface="Spectral SemiBold"/>
-              <a:cs typeface="Spectral SemiBold"/>
-              <a:sym typeface="Spectral SemiBold"/>
-            </a:endParaRPr>
-          </a:p>
-        </p:txBody>
-      </p:sp>
+      </p:pic>
     </p:spTree>
   </p:cSld>
   <p:clrMapOvr>
@@ -6991,196 +7303,12 @@
           <p:cNvPr id="70" name="Google Shape;70;p15"/>
           <p:cNvSpPr txBox="1"/>
           <p:nvPr>
-            <p:ph idx="1" type="body"/>
-          </p:nvPr>
-        </p:nvSpPr>
-        <p:spPr>
-          <a:xfrm>
-            <a:off x="311700" y="1298150"/>
-            <a:ext cx="8520600" cy="3416400"/>
-          </a:xfrm>
-          <a:prstGeom prst="rect">
-            <a:avLst/>
-          </a:prstGeom>
-        </p:spPr>
-        <p:txBody>
-          <a:bodyPr anchorCtr="0" anchor="t" bIns="91425" lIns="91425" spcFirstLastPara="1" rIns="91425" wrap="square" tIns="91425">
-            <a:noAutofit/>
-          </a:bodyPr>
-          <a:lstStyle/>
-          <a:p>
-            <a:pPr indent="0" lvl="0" marL="0" rtl="0" algn="l">
-              <a:spcBef>
-                <a:spcPts val="0"/>
-              </a:spcBef>
-              <a:spcAft>
-                <a:spcPts val="0"/>
-              </a:spcAft>
-              <a:buClr>
-                <a:schemeClr val="dk2"/>
-              </a:buClr>
-              <a:buSzPts val="1100"/>
-              <a:buFont typeface="Arial"/>
-              <a:buNone/>
-            </a:pPr>
-            <a:r>
-              <a:rPr lang="es">
-                <a:solidFill>
-                  <a:schemeClr val="dk2"/>
-                </a:solidFill>
-                <a:latin typeface="Spectral SemiBold"/>
-                <a:ea typeface="Spectral SemiBold"/>
-                <a:cs typeface="Spectral SemiBold"/>
-                <a:sym typeface="Spectral SemiBold"/>
-              </a:rPr>
-              <a:t>La aplicación está pensada para grupos de personas que se juntan a jugar al fútbol habitualmente.</a:t>
-            </a:r>
-            <a:endParaRPr>
-              <a:solidFill>
-                <a:schemeClr val="dk2"/>
-              </a:solidFill>
-              <a:latin typeface="Spectral SemiBold"/>
-              <a:ea typeface="Spectral SemiBold"/>
-              <a:cs typeface="Spectral SemiBold"/>
-              <a:sym typeface="Spectral SemiBold"/>
-            </a:endParaRPr>
-          </a:p>
-          <a:p>
-            <a:pPr indent="0" lvl="0" marL="0" rtl="0" algn="l">
-              <a:spcBef>
-                <a:spcPts val="0"/>
-              </a:spcBef>
-              <a:spcAft>
-                <a:spcPts val="0"/>
-              </a:spcAft>
-              <a:buClr>
-                <a:schemeClr val="dk2"/>
-              </a:buClr>
-              <a:buSzPts val="1100"/>
-              <a:buFont typeface="Arial"/>
-              <a:buNone/>
-            </a:pPr>
-            <a:r>
-              <a:rPr lang="es">
-                <a:solidFill>
-                  <a:schemeClr val="dk2"/>
-                </a:solidFill>
-                <a:latin typeface="Spectral SemiBold"/>
-                <a:ea typeface="Spectral SemiBold"/>
-                <a:cs typeface="Spectral SemiBold"/>
-                <a:sym typeface="Spectral SemiBold"/>
-              </a:rPr>
-              <a:t>El objetivo es organizar de manera centralizada y amigable los jugadores que se anotan al partido.</a:t>
-            </a:r>
-            <a:endParaRPr>
-              <a:solidFill>
-                <a:schemeClr val="dk2"/>
-              </a:solidFill>
-              <a:latin typeface="Spectral SemiBold"/>
-              <a:ea typeface="Spectral SemiBold"/>
-              <a:cs typeface="Spectral SemiBold"/>
-              <a:sym typeface="Spectral SemiBold"/>
-            </a:endParaRPr>
-          </a:p>
-          <a:p>
-            <a:pPr indent="0" lvl="0" marL="0" rtl="0" algn="l">
-              <a:spcBef>
-                <a:spcPts val="0"/>
-              </a:spcBef>
-              <a:spcAft>
-                <a:spcPts val="0"/>
-              </a:spcAft>
-              <a:buClr>
-                <a:schemeClr val="dk2"/>
-              </a:buClr>
-              <a:buSzPts val="1100"/>
-              <a:buFont typeface="Arial"/>
-              <a:buNone/>
-            </a:pPr>
-            <a:r>
-              <a:rPr lang="es">
-                <a:solidFill>
-                  <a:srgbClr val="24292E"/>
-                </a:solidFill>
-                <a:highlight>
-                  <a:srgbClr val="FFFFFF"/>
-                </a:highlight>
-                <a:latin typeface="Spectral SemiBold"/>
-                <a:ea typeface="Spectral SemiBold"/>
-                <a:cs typeface="Spectral SemiBold"/>
-                <a:sym typeface="Spectral SemiBold"/>
-              </a:rPr>
-              <a:t>La idea es brindar una herramienta que facilite la organización.  Para reemplazar al típico grupo de Whatsapp, sabiendo que tiende a ser desprolijo, presta a confusión, y muchas veces es invadido por infinidad de mensajes, fotos, videos, etc. que no tienen nada que ver con el fin con el que fue creado.</a:t>
-            </a:r>
-            <a:endParaRPr>
-              <a:solidFill>
-                <a:schemeClr val="dk1"/>
-              </a:solidFill>
-            </a:endParaRPr>
-          </a:p>
-          <a:p>
-            <a:pPr indent="0" lvl="0" marL="0" rtl="0" algn="l">
-              <a:spcBef>
-                <a:spcPts val="0"/>
-              </a:spcBef>
-              <a:spcAft>
-                <a:spcPts val="0"/>
-              </a:spcAft>
-              <a:buNone/>
-            </a:pPr>
-            <a:r>
-              <a:t/>
-            </a:r>
-            <a:endParaRPr>
-              <a:solidFill>
-                <a:schemeClr val="dk1"/>
-              </a:solidFill>
-            </a:endParaRPr>
-          </a:p>
-          <a:p>
-            <a:pPr indent="0" lvl="0" marL="0" rtl="0" algn="l">
-              <a:spcBef>
-                <a:spcPts val="0"/>
-              </a:spcBef>
-              <a:spcAft>
-                <a:spcPts val="0"/>
-              </a:spcAft>
-              <a:buClr>
-                <a:schemeClr val="dk1"/>
-              </a:buClr>
-              <a:buSzPts val="1100"/>
-              <a:buFont typeface="Arial"/>
-              <a:buNone/>
-            </a:pPr>
-            <a:r>
-              <a:t/>
-            </a:r>
-            <a:endParaRPr>
-              <a:solidFill>
-                <a:srgbClr val="24292E"/>
-              </a:solidFill>
-              <a:highlight>
-                <a:srgbClr val="FFFFFF"/>
-              </a:highlight>
-              <a:latin typeface="Arial"/>
-              <a:ea typeface="Arial"/>
-              <a:cs typeface="Arial"/>
-              <a:sym typeface="Arial"/>
-            </a:endParaRPr>
-          </a:p>
-        </p:txBody>
-      </p:sp>
-      <p:sp>
-        <p:nvSpPr>
-          <p:cNvPr id="71" name="Google Shape;71;p15"/>
-          <p:cNvSpPr txBox="1"/>
-          <p:nvPr>
             <p:ph type="title"/>
           </p:nvPr>
         </p:nvSpPr>
         <p:spPr>
           <a:xfrm>
-            <a:off x="311700" y="445025"/>
+            <a:off x="311700" y="355375"/>
             <a:ext cx="8520600" cy="623400"/>
           </a:xfrm>
           <a:prstGeom prst="rect">
@@ -7203,10 +7331,128 @@
               <a:buNone/>
             </a:pPr>
             <a:r>
-              <a:rPr lang="es"/>
-              <a:t>¿Qué resuelve?</a:t>
+              <a:rPr b="0" lang="es">
+                <a:latin typeface="Spectral ExtraBold"/>
+                <a:ea typeface="Spectral ExtraBold"/>
+                <a:cs typeface="Spectral ExtraBold"/>
+                <a:sym typeface="Spectral ExtraBold"/>
+              </a:rPr>
+              <a:t>Motivación</a:t>
             </a:r>
-            <a:endParaRPr/>
+            <a:endParaRPr b="0">
+              <a:latin typeface="Spectral ExtraBold"/>
+              <a:ea typeface="Spectral ExtraBold"/>
+              <a:cs typeface="Spectral ExtraBold"/>
+              <a:sym typeface="Spectral ExtraBold"/>
+            </a:endParaRPr>
+          </a:p>
+        </p:txBody>
+      </p:sp>
+      <p:sp>
+        <p:nvSpPr>
+          <p:cNvPr id="71" name="Google Shape;71;p15"/>
+          <p:cNvSpPr txBox="1"/>
+          <p:nvPr>
+            <p:ph idx="1" type="body"/>
+          </p:nvPr>
+        </p:nvSpPr>
+        <p:spPr>
+          <a:xfrm>
+            <a:off x="532350" y="1371100"/>
+            <a:ext cx="8227200" cy="1290300"/>
+          </a:xfrm>
+          <a:prstGeom prst="rect">
+            <a:avLst/>
+          </a:prstGeom>
+        </p:spPr>
+        <p:txBody>
+          <a:bodyPr anchorCtr="0" anchor="t" bIns="91425" lIns="91425" spcFirstLastPara="1" rIns="91425" wrap="square" tIns="91425">
+            <a:noAutofit/>
+          </a:bodyPr>
+          <a:lstStyle/>
+          <a:p>
+            <a:pPr indent="0" lvl="0" marL="0" rtl="0" algn="l">
+              <a:spcBef>
+                <a:spcPts val="0"/>
+              </a:spcBef>
+              <a:spcAft>
+                <a:spcPts val="0"/>
+              </a:spcAft>
+              <a:buNone/>
+            </a:pPr>
+            <a:r>
+              <a:rPr lang="es" sz="2000">
+                <a:solidFill>
+                  <a:srgbClr val="24292E"/>
+                </a:solidFill>
+                <a:highlight>
+                  <a:srgbClr val="FFFFFF"/>
+                </a:highlight>
+                <a:latin typeface="Spectral SemiBold"/>
+                <a:ea typeface="Spectral SemiBold"/>
+                <a:cs typeface="Spectral SemiBold"/>
+                <a:sym typeface="Spectral SemiBold"/>
+              </a:rPr>
+              <a:t>F5 surge como una idea para el proyecto final, inspirado principalmente en la posibilidad de poder armar algo que brinde una solución (o mejora) a una “problemática” diaria, dentro de un contexto de una actividad con amigos, como es jugar al fútbol.  Donde se mezclan la pasión por el deporte (en este caso el fútbol) y la posibilidad de divertirse con amigos.</a:t>
+            </a:r>
+            <a:endParaRPr sz="2000">
+              <a:solidFill>
+                <a:srgbClr val="24292E"/>
+              </a:solidFill>
+              <a:highlight>
+                <a:srgbClr val="FFFFFF"/>
+              </a:highlight>
+              <a:latin typeface="Spectral SemiBold"/>
+              <a:ea typeface="Spectral SemiBold"/>
+              <a:cs typeface="Spectral SemiBold"/>
+              <a:sym typeface="Spectral SemiBold"/>
+            </a:endParaRPr>
+          </a:p>
+          <a:p>
+            <a:pPr indent="0" lvl="0" marL="0" rtl="0" algn="l">
+              <a:spcBef>
+                <a:spcPts val="0"/>
+              </a:spcBef>
+              <a:spcAft>
+                <a:spcPts val="0"/>
+              </a:spcAft>
+              <a:buNone/>
+            </a:pPr>
+            <a:r>
+              <a:t/>
+            </a:r>
+            <a:endParaRPr sz="2000">
+              <a:solidFill>
+                <a:srgbClr val="000000"/>
+              </a:solidFill>
+              <a:latin typeface="Spectral SemiBold"/>
+              <a:ea typeface="Spectral SemiBold"/>
+              <a:cs typeface="Spectral SemiBold"/>
+              <a:sym typeface="Spectral SemiBold"/>
+            </a:endParaRPr>
+          </a:p>
+          <a:p>
+            <a:pPr indent="0" lvl="0" marL="0" rtl="0" algn="l">
+              <a:spcBef>
+                <a:spcPts val="0"/>
+              </a:spcBef>
+              <a:spcAft>
+                <a:spcPts val="1600"/>
+              </a:spcAft>
+              <a:buNone/>
+            </a:pPr>
+            <a:r>
+              <a:t/>
+            </a:r>
+            <a:endParaRPr sz="2000">
+              <a:solidFill>
+                <a:srgbClr val="000000"/>
+              </a:solidFill>
+              <a:latin typeface="Spectral SemiBold"/>
+              <a:ea typeface="Spectral SemiBold"/>
+              <a:cs typeface="Spectral SemiBold"/>
+              <a:sym typeface="Spectral SemiBold"/>
+            </a:endParaRPr>
           </a:p>
         </p:txBody>
       </p:sp>
@@ -7245,6 +7491,255 @@
         </p:nvSpPr>
         <p:spPr>
           <a:xfrm>
+            <a:off x="311700" y="1298150"/>
+            <a:ext cx="8520600" cy="3416400"/>
+          </a:xfrm>
+          <a:prstGeom prst="rect">
+            <a:avLst/>
+          </a:prstGeom>
+        </p:spPr>
+        <p:txBody>
+          <a:bodyPr anchorCtr="0" anchor="t" bIns="91425" lIns="91425" spcFirstLastPara="1" rIns="91425" wrap="square" tIns="91425">
+            <a:noAutofit/>
+          </a:bodyPr>
+          <a:lstStyle/>
+          <a:p>
+            <a:pPr indent="0" lvl="0" marL="0" rtl="0" algn="l">
+              <a:spcBef>
+                <a:spcPts val="0"/>
+              </a:spcBef>
+              <a:spcAft>
+                <a:spcPts val="0"/>
+              </a:spcAft>
+              <a:buClr>
+                <a:schemeClr val="dk2"/>
+              </a:buClr>
+              <a:buSzPts val="1100"/>
+              <a:buFont typeface="Arial"/>
+              <a:buNone/>
+            </a:pPr>
+            <a:r>
+              <a:rPr lang="es">
+                <a:solidFill>
+                  <a:schemeClr val="dk2"/>
+                </a:solidFill>
+                <a:latin typeface="Spectral SemiBold"/>
+                <a:ea typeface="Spectral SemiBold"/>
+                <a:cs typeface="Spectral SemiBold"/>
+                <a:sym typeface="Spectral SemiBold"/>
+              </a:rPr>
+              <a:t>La aplicación está pensada para grupos de personas que se juntan a jugar al fútbol habitualmente.</a:t>
+            </a:r>
+            <a:endParaRPr>
+              <a:solidFill>
+                <a:schemeClr val="dk2"/>
+              </a:solidFill>
+              <a:latin typeface="Spectral SemiBold"/>
+              <a:ea typeface="Spectral SemiBold"/>
+              <a:cs typeface="Spectral SemiBold"/>
+              <a:sym typeface="Spectral SemiBold"/>
+            </a:endParaRPr>
+          </a:p>
+          <a:p>
+            <a:pPr indent="0" lvl="0" marL="0" rtl="0" algn="l">
+              <a:spcBef>
+                <a:spcPts val="0"/>
+              </a:spcBef>
+              <a:spcAft>
+                <a:spcPts val="0"/>
+              </a:spcAft>
+              <a:buClr>
+                <a:schemeClr val="dk2"/>
+              </a:buClr>
+              <a:buSzPts val="1100"/>
+              <a:buFont typeface="Arial"/>
+              <a:buNone/>
+            </a:pPr>
+            <a:r>
+              <a:rPr lang="es">
+                <a:solidFill>
+                  <a:schemeClr val="dk2"/>
+                </a:solidFill>
+                <a:latin typeface="Spectral SemiBold"/>
+                <a:ea typeface="Spectral SemiBold"/>
+                <a:cs typeface="Spectral SemiBold"/>
+                <a:sym typeface="Spectral SemiBold"/>
+              </a:rPr>
+              <a:t>El objetivo es organizar de manera centralizada y amigable los jugadores que se anotan al partido.</a:t>
+            </a:r>
+            <a:endParaRPr>
+              <a:solidFill>
+                <a:schemeClr val="dk2"/>
+              </a:solidFill>
+              <a:latin typeface="Spectral SemiBold"/>
+              <a:ea typeface="Spectral SemiBold"/>
+              <a:cs typeface="Spectral SemiBold"/>
+              <a:sym typeface="Spectral SemiBold"/>
+            </a:endParaRPr>
+          </a:p>
+          <a:p>
+            <a:pPr indent="0" lvl="0" marL="0" rtl="0" algn="l">
+              <a:spcBef>
+                <a:spcPts val="0"/>
+              </a:spcBef>
+              <a:spcAft>
+                <a:spcPts val="0"/>
+              </a:spcAft>
+              <a:buClr>
+                <a:schemeClr val="dk2"/>
+              </a:buClr>
+              <a:buSzPts val="1100"/>
+              <a:buFont typeface="Arial"/>
+              <a:buNone/>
+            </a:pPr>
+            <a:r>
+              <a:rPr lang="es">
+                <a:solidFill>
+                  <a:srgbClr val="24292E"/>
+                </a:solidFill>
+                <a:highlight>
+                  <a:srgbClr val="FFFFFF"/>
+                </a:highlight>
+                <a:latin typeface="Spectral SemiBold"/>
+                <a:ea typeface="Spectral SemiBold"/>
+                <a:cs typeface="Spectral SemiBold"/>
+                <a:sym typeface="Spectral SemiBold"/>
+              </a:rPr>
+              <a:t>La idea es brindar una herramienta que facilite la organización.  Para reemplazar al típico grupo de Whatsapp, sabiendo que tiende a ser desprolijo, presta a confusión, y muchas veces es invadido por infinidad de mensajes, fotos, videos, etc. que no tienen nada que ver con el fin con el que fue creado.</a:t>
+            </a:r>
+            <a:endParaRPr>
+              <a:solidFill>
+                <a:schemeClr val="dk1"/>
+              </a:solidFill>
+            </a:endParaRPr>
+          </a:p>
+          <a:p>
+            <a:pPr indent="0" lvl="0" marL="0" rtl="0" algn="l">
+              <a:spcBef>
+                <a:spcPts val="0"/>
+              </a:spcBef>
+              <a:spcAft>
+                <a:spcPts val="0"/>
+              </a:spcAft>
+              <a:buNone/>
+            </a:pPr>
+            <a:r>
+              <a:t/>
+            </a:r>
+            <a:endParaRPr>
+              <a:solidFill>
+                <a:schemeClr val="dk1"/>
+              </a:solidFill>
+            </a:endParaRPr>
+          </a:p>
+          <a:p>
+            <a:pPr indent="0" lvl="0" marL="0" rtl="0" algn="l">
+              <a:spcBef>
+                <a:spcPts val="0"/>
+              </a:spcBef>
+              <a:spcAft>
+                <a:spcPts val="0"/>
+              </a:spcAft>
+              <a:buClr>
+                <a:schemeClr val="dk1"/>
+              </a:buClr>
+              <a:buSzPts val="1100"/>
+              <a:buFont typeface="Arial"/>
+              <a:buNone/>
+            </a:pPr>
+            <a:r>
+              <a:t/>
+            </a:r>
+            <a:endParaRPr>
+              <a:solidFill>
+                <a:srgbClr val="24292E"/>
+              </a:solidFill>
+              <a:highlight>
+                <a:srgbClr val="FFFFFF"/>
+              </a:highlight>
+              <a:latin typeface="Arial"/>
+              <a:ea typeface="Arial"/>
+              <a:cs typeface="Arial"/>
+              <a:sym typeface="Arial"/>
+            </a:endParaRPr>
+          </a:p>
+        </p:txBody>
+      </p:sp>
+      <p:sp>
+        <p:nvSpPr>
+          <p:cNvPr id="77" name="Google Shape;77;p16"/>
+          <p:cNvSpPr txBox="1"/>
+          <p:nvPr>
+            <p:ph type="title"/>
+          </p:nvPr>
+        </p:nvSpPr>
+        <p:spPr>
+          <a:xfrm>
+            <a:off x="311700" y="445025"/>
+            <a:ext cx="8520600" cy="623400"/>
+          </a:xfrm>
+          <a:prstGeom prst="rect">
+            <a:avLst/>
+          </a:prstGeom>
+        </p:spPr>
+        <p:txBody>
+          <a:bodyPr anchorCtr="0" anchor="t" bIns="91425" lIns="91425" spcFirstLastPara="1" rIns="91425" wrap="square" tIns="91425">
+            <a:noAutofit/>
+          </a:bodyPr>
+          <a:lstStyle/>
+          <a:p>
+            <a:pPr indent="0" lvl="0" marL="0" rtl="0" algn="l">
+              <a:spcBef>
+                <a:spcPts val="0"/>
+              </a:spcBef>
+              <a:spcAft>
+                <a:spcPts val="0"/>
+              </a:spcAft>
+              <a:buNone/>
+            </a:pPr>
+            <a:r>
+              <a:rPr lang="es"/>
+              <a:t>¿Qué resuelve?</a:t>
+            </a:r>
+            <a:endParaRPr/>
+          </a:p>
+        </p:txBody>
+      </p:sp>
+    </p:spTree>
+  </p:cSld>
+  <p:clrMapOvr>
+    <a:masterClrMapping/>
+  </p:clrMapOvr>
+</p:sld>
+</file>
+
+<file path=ppt/slides/slide5.xml><?xml version="1.0" encoding="utf-8"?>
+<p:sld xmlns:a="http://schemas.openxmlformats.org/drawingml/2006/main" xmlns:r="http://schemas.openxmlformats.org/officeDocument/2006/relationships" xmlns:mc="http://schemas.openxmlformats.org/markup-compatibility/2006" xmlns:mv="urn:schemas-microsoft-com:mac:vml" xmlns:p="http://schemas.openxmlformats.org/presentationml/2006/main" xmlns:c="http://schemas.openxmlformats.org/drawingml/2006/chart" xmlns:dgm="http://schemas.openxmlformats.org/drawingml/2006/diagram" xmlns:o="urn:schemas-microsoft-com:office:office" xmlns:v="urn:schemas-microsoft-com:vml" xmlns:pvml="urn:schemas-microsoft-com:office:powerpoint" xmlns:com="http://schemas.openxmlformats.org/drawingml/2006/compatibility" xmlns:p14="http://schemas.microsoft.com/office/powerpoint/2010/main" xmlns:p15="http://schemas.microsoft.com/office/powerpoint/2012/main">
+  <p:cSld>
+    <p:spTree>
+      <p:nvGrpSpPr>
+        <p:cNvPr id="81" name="Shape 81"/>
+        <p:cNvGrpSpPr/>
+        <p:nvPr/>
+      </p:nvGrpSpPr>
+      <p:grpSpPr>
+        <a:xfrm>
+          <a:off x="0" y="0"/>
+          <a:ext cx="0" cy="0"/>
+          <a:chOff x="0" y="0"/>
+          <a:chExt cx="0" cy="0"/>
+        </a:xfrm>
+      </p:grpSpPr>
+      <p:sp>
+        <p:nvSpPr>
+          <p:cNvPr id="82" name="Google Shape;82;p17"/>
+          <p:cNvSpPr txBox="1"/>
+          <p:nvPr>
+            <p:ph idx="1" type="body"/>
+          </p:nvPr>
+        </p:nvSpPr>
+        <p:spPr>
+          <a:xfrm>
             <a:off x="311700" y="863550"/>
             <a:ext cx="8520600" cy="3416400"/>
           </a:xfrm>
@@ -7397,7 +7892,7 @@
                 <a:cs typeface="Spectral SemiBold"/>
                 <a:sym typeface="Spectral SemiBold"/>
               </a:rPr>
-              <a:t>Poder poner el resultado a los partidos, los equipos que se armaron.   Para armar una sección de estadísticas, ver historiales</a:t>
+              <a:t>Poder poner el resultado a los partidos, los equipos que se armaron.   Para armar una sección de estadísticas, ver historiales, etc.</a:t>
             </a:r>
             <a:endParaRPr sz="1300">
               <a:solidFill>
@@ -7452,7 +7947,31 @@
                 <a:cs typeface="Spectral SemiBold"/>
                 <a:sym typeface="Spectral SemiBold"/>
               </a:rPr>
-              <a:t>Un posible feature podría ser dar características y valoraciones a los perfiles de los jugadores, para armar un algoritmo, que en base a los jugadores anotados para un partido, arme equipos "parejos" en base a dichas características (también una opción para que arme al azar).</a:t>
+              <a:t>Un posible </a:t>
+            </a:r>
+            <a:r>
+              <a:rPr i="1" lang="es" sz="1300">
+                <a:solidFill>
+                  <a:srgbClr val="000000"/>
+                </a:solidFill>
+                <a:latin typeface="Spectral SemiBold"/>
+                <a:ea typeface="Spectral SemiBold"/>
+                <a:cs typeface="Spectral SemiBold"/>
+                <a:sym typeface="Spectral SemiBold"/>
+              </a:rPr>
+              <a:t>feature</a:t>
+            </a:r>
+            <a:r>
+              <a:rPr lang="es" sz="1300">
+                <a:solidFill>
+                  <a:srgbClr val="000000"/>
+                </a:solidFill>
+                <a:latin typeface="Spectral SemiBold"/>
+                <a:ea typeface="Spectral SemiBold"/>
+                <a:cs typeface="Spectral SemiBold"/>
+                <a:sym typeface="Spectral SemiBold"/>
+              </a:rPr>
+              <a:t> podría ser dar características y valoraciones a los perfiles de los jugadores, para armar un algoritmo, que en base a los jugadores anotados para un partido, arme equipos "parejos" en base a dichas características (también una opción para que arme al azar).</a:t>
             </a:r>
             <a:endParaRPr sz="1300">
               <a:solidFill>
@@ -7556,7 +8075,7 @@
       </p:sp>
       <p:sp>
         <p:nvSpPr>
-          <p:cNvPr id="77" name="Google Shape;77;p16"/>
+          <p:cNvPr id="83" name="Google Shape;83;p17"/>
           <p:cNvSpPr txBox="1"/>
           <p:nvPr>
             <p:ph type="title"/>
@@ -7602,7 +8121,7 @@
 </p:sld>
 </file>
 
-<file path=ppt/slides/slide5.xml><?xml version="1.0" encoding="utf-8"?>
+<file path=ppt/slides/slide6.xml><?xml version="1.0" encoding="utf-8"?>
 <p:sld xmlns:a="http://schemas.openxmlformats.org/drawingml/2006/main" xmlns:r="http://schemas.openxmlformats.org/officeDocument/2006/relationships" xmlns:mc="http://schemas.openxmlformats.org/markup-compatibility/2006" xmlns:mv="urn:schemas-microsoft-com:mac:vml" xmlns:p="http://schemas.openxmlformats.org/presentationml/2006/main" xmlns:c="http://schemas.openxmlformats.org/drawingml/2006/chart" xmlns:dgm="http://schemas.openxmlformats.org/drawingml/2006/diagram" xmlns:o="urn:schemas-microsoft-com:office:office" xmlns:v="urn:schemas-microsoft-com:vml" xmlns:pvml="urn:schemas-microsoft-com:office:powerpoint" xmlns:com="http://schemas.openxmlformats.org/drawingml/2006/compatibility" xmlns:p14="http://schemas.microsoft.com/office/powerpoint/2010/main" xmlns:p15="http://schemas.microsoft.com/office/powerpoint/2012/main">
   <p:cSld>
     <p:bg>
@@ -7614,7 +8133,7 @@
     </p:bg>
     <p:spTree>
       <p:nvGrpSpPr>
-        <p:cNvPr id="81" name="Shape 81"/>
+        <p:cNvPr id="87" name="Shape 87"/>
         <p:cNvGrpSpPr/>
         <p:nvPr/>
       </p:nvGrpSpPr>
@@ -7628,7 +8147,7 @@
       </p:grpSpPr>
       <p:pic>
         <p:nvPicPr>
-          <p:cNvPr id="82" name="Google Shape;82;p17"/>
+          <p:cNvPr id="88" name="Google Shape;88;p18"/>
           <p:cNvPicPr preferRelativeResize="0"/>
           <p:nvPr/>
         </p:nvPicPr>
@@ -7656,7 +8175,7 @@
       </p:pic>
       <p:sp>
         <p:nvSpPr>
-          <p:cNvPr id="83" name="Google Shape;83;p17"/>
+          <p:cNvPr id="89" name="Google Shape;89;p18"/>
           <p:cNvSpPr txBox="1"/>
           <p:nvPr/>
         </p:nvSpPr>
@@ -7708,7 +8227,7 @@
       </p:sp>
       <p:pic>
         <p:nvPicPr>
-          <p:cNvPr id="84" name="Google Shape;84;p17"/>
+          <p:cNvPr id="90" name="Google Shape;90;p18"/>
           <p:cNvPicPr preferRelativeResize="0"/>
           <p:nvPr/>
         </p:nvPicPr>
@@ -7776,7 +8295,7 @@
                                           </p:stCondLst>
                                         </p:cTn>
                                         <p:tgtEl>
-                                          <p:spTgt spid="84"/>
+                                          <p:spTgt spid="90"/>
                                         </p:tgtEl>
                                         <p:attrNameLst>
                                           <p:attrName>style.visibility</p:attrName>
@@ -7790,7 +8309,7 @@
                                       <p:cBhvr additive="base">
                                         <p:cTn dur="3600"/>
                                         <p:tgtEl>
-                                          <p:spTgt spid="84"/>
+                                          <p:spTgt spid="90"/>
                                         </p:tgtEl>
                                         <p:attrNameLst>
                                           <p:attrName>ppt_y</p:attrName>
@@ -7843,12 +8362,19 @@
 </p:sld>
 </file>
 
-<file path=ppt/slides/slide6.xml><?xml version="1.0" encoding="utf-8"?>
+<file path=ppt/slides/slide7.xml><?xml version="1.0" encoding="utf-8"?>
 <p:sld xmlns:a="http://schemas.openxmlformats.org/drawingml/2006/main" xmlns:r="http://schemas.openxmlformats.org/officeDocument/2006/relationships" xmlns:mc="http://schemas.openxmlformats.org/markup-compatibility/2006" xmlns:mv="urn:schemas-microsoft-com:mac:vml" xmlns:p="http://schemas.openxmlformats.org/presentationml/2006/main" xmlns:c="http://schemas.openxmlformats.org/drawingml/2006/chart" xmlns:dgm="http://schemas.openxmlformats.org/drawingml/2006/diagram" xmlns:o="urn:schemas-microsoft-com:office:office" xmlns:v="urn:schemas-microsoft-com:vml" xmlns:pvml="urn:schemas-microsoft-com:office:powerpoint" xmlns:com="http://schemas.openxmlformats.org/drawingml/2006/compatibility" xmlns:p14="http://schemas.microsoft.com/office/powerpoint/2010/main" xmlns:p15="http://schemas.microsoft.com/office/powerpoint/2012/main">
   <p:cSld>
+    <p:bg>
+      <p:bgPr>
+        <a:solidFill>
+          <a:srgbClr val="FFFFFF"/>
+        </a:solidFill>
+      </p:bgPr>
+    </p:bg>
     <p:spTree>
       <p:nvGrpSpPr>
-        <p:cNvPr id="88" name="Shape 88"/>
+        <p:cNvPr id="94" name="Shape 94"/>
         <p:cNvGrpSpPr/>
         <p:nvPr/>
       </p:nvGrpSpPr>
@@ -7862,7 +8388,146 @@
       </p:grpSpPr>
       <p:sp>
         <p:nvSpPr>
-          <p:cNvPr id="89" name="Google Shape;89;p18"/>
+          <p:cNvPr id="95" name="Google Shape;95;p19"/>
+          <p:cNvSpPr txBox="1"/>
+          <p:nvPr>
+            <p:ph idx="1" type="body"/>
+          </p:nvPr>
+        </p:nvSpPr>
+        <p:spPr>
+          <a:xfrm>
+            <a:off x="532350" y="1371100"/>
+            <a:ext cx="8227200" cy="1290300"/>
+          </a:xfrm>
+          <a:prstGeom prst="rect">
+            <a:avLst/>
+          </a:prstGeom>
+        </p:spPr>
+        <p:txBody>
+          <a:bodyPr anchorCtr="0" anchor="t" bIns="91425" lIns="91425" spcFirstLastPara="1" rIns="91425" wrap="square" tIns="91425">
+            <a:noAutofit/>
+          </a:bodyPr>
+          <a:lstStyle/>
+          <a:p>
+            <a:pPr indent="0" lvl="0" marL="0" rtl="0" algn="ctr">
+              <a:spcBef>
+                <a:spcPts val="0"/>
+              </a:spcBef>
+              <a:spcAft>
+                <a:spcPts val="0"/>
+              </a:spcAft>
+              <a:buNone/>
+            </a:pPr>
+            <a:r>
+              <a:rPr lang="es" sz="7400">
+                <a:solidFill>
+                  <a:srgbClr val="24292E"/>
+                </a:solidFill>
+                <a:highlight>
+                  <a:srgbClr val="FFFFFF"/>
+                </a:highlight>
+                <a:latin typeface="Spectral SemiBold"/>
+                <a:ea typeface="Spectral SemiBold"/>
+                <a:cs typeface="Spectral SemiBold"/>
+                <a:sym typeface="Spectral SemiBold"/>
+              </a:rPr>
+              <a:t>DEMO</a:t>
+            </a:r>
+            <a:endParaRPr sz="7400">
+              <a:solidFill>
+                <a:srgbClr val="24292E"/>
+              </a:solidFill>
+              <a:highlight>
+                <a:srgbClr val="FFFFFF"/>
+              </a:highlight>
+              <a:latin typeface="Spectral SemiBold"/>
+              <a:ea typeface="Spectral SemiBold"/>
+              <a:cs typeface="Spectral SemiBold"/>
+              <a:sym typeface="Spectral SemiBold"/>
+            </a:endParaRPr>
+          </a:p>
+          <a:p>
+            <a:pPr indent="0" lvl="0" marL="0" rtl="0" algn="l">
+              <a:spcBef>
+                <a:spcPts val="1600"/>
+              </a:spcBef>
+              <a:spcAft>
+                <a:spcPts val="0"/>
+              </a:spcAft>
+              <a:buNone/>
+            </a:pPr>
+            <a:r>
+              <a:t/>
+            </a:r>
+            <a:endParaRPr sz="2000">
+              <a:solidFill>
+                <a:srgbClr val="24292E"/>
+              </a:solidFill>
+              <a:highlight>
+                <a:srgbClr val="FFFFFF"/>
+              </a:highlight>
+              <a:latin typeface="Spectral SemiBold"/>
+              <a:ea typeface="Spectral SemiBold"/>
+              <a:cs typeface="Spectral SemiBold"/>
+              <a:sym typeface="Spectral SemiBold"/>
+            </a:endParaRPr>
+          </a:p>
+          <a:p>
+            <a:pPr indent="0" lvl="0" marL="0" rtl="0" algn="l">
+              <a:spcBef>
+                <a:spcPts val="1600"/>
+              </a:spcBef>
+              <a:spcAft>
+                <a:spcPts val="1600"/>
+              </a:spcAft>
+              <a:buNone/>
+            </a:pPr>
+            <a:r>
+              <a:t/>
+            </a:r>
+            <a:endParaRPr sz="2100">
+              <a:solidFill>
+                <a:srgbClr val="24292E"/>
+              </a:solidFill>
+              <a:highlight>
+                <a:srgbClr val="FFFFFF"/>
+              </a:highlight>
+              <a:latin typeface="Spectral SemiBold"/>
+              <a:ea typeface="Spectral SemiBold"/>
+              <a:cs typeface="Spectral SemiBold"/>
+              <a:sym typeface="Spectral SemiBold"/>
+            </a:endParaRPr>
+          </a:p>
+        </p:txBody>
+      </p:sp>
+    </p:spTree>
+  </p:cSld>
+  <p:clrMapOvr>
+    <a:masterClrMapping/>
+  </p:clrMapOvr>
+</p:sld>
+</file>
+
+<file path=ppt/slides/slide8.xml><?xml version="1.0" encoding="utf-8"?>
+<p:sld xmlns:a="http://schemas.openxmlformats.org/drawingml/2006/main" xmlns:r="http://schemas.openxmlformats.org/officeDocument/2006/relationships" xmlns:mc="http://schemas.openxmlformats.org/markup-compatibility/2006" xmlns:mv="urn:schemas-microsoft-com:mac:vml" xmlns:p="http://schemas.openxmlformats.org/presentationml/2006/main" xmlns:c="http://schemas.openxmlformats.org/drawingml/2006/chart" xmlns:dgm="http://schemas.openxmlformats.org/drawingml/2006/diagram" xmlns:o="urn:schemas-microsoft-com:office:office" xmlns:v="urn:schemas-microsoft-com:vml" xmlns:pvml="urn:schemas-microsoft-com:office:powerpoint" xmlns:com="http://schemas.openxmlformats.org/drawingml/2006/compatibility" xmlns:p14="http://schemas.microsoft.com/office/powerpoint/2010/main" xmlns:p15="http://schemas.microsoft.com/office/powerpoint/2012/main">
+  <p:cSld>
+    <p:spTree>
+      <p:nvGrpSpPr>
+        <p:cNvPr id="99" name="Shape 99"/>
+        <p:cNvGrpSpPr/>
+        <p:nvPr/>
+      </p:nvGrpSpPr>
+      <p:grpSpPr>
+        <a:xfrm>
+          <a:off x="0" y="0"/>
+          <a:ext cx="0" cy="0"/>
+          <a:chOff x="0" y="0"/>
+          <a:chExt cx="0" cy="0"/>
+        </a:xfrm>
+      </p:grpSpPr>
+      <p:sp>
+        <p:nvSpPr>
+          <p:cNvPr id="100" name="Google Shape;100;p20"/>
           <p:cNvSpPr txBox="1"/>
           <p:nvPr>
             <p:ph type="title"/>
@@ -7912,7 +8577,7 @@
       </p:sp>
       <p:pic>
         <p:nvPicPr>
-          <p:cNvPr id="90" name="Google Shape;90;p18"/>
+          <p:cNvPr id="101" name="Google Shape;101;p20"/>
           <p:cNvPicPr preferRelativeResize="0"/>
           <p:nvPr/>
         </p:nvPicPr>

</xml_diff>